<commit_message>
adding changes for Todd's comments
</commit_message>
<xml_diff>
--- a/paper/v2/figures/pipeline.pptx
+++ b/paper/v2/figures/pipeline.pptx
@@ -247,7 +247,7 @@
           <a:p>
             <a:fld id="{0621BF35-B844-4EAB-BD7B-7E9CADDC35E5}" type="datetimeFigureOut">
               <a:rPr lang="en-US" smtClean="0"/>
-              <a:t>6/19/16</a:t>
+              <a:t>6/20/16</a:t>
             </a:fld>
             <a:endParaRPr lang="en-US"/>
           </a:p>
@@ -417,7 +417,7 @@
           <a:p>
             <a:fld id="{0621BF35-B844-4EAB-BD7B-7E9CADDC35E5}" type="datetimeFigureOut">
               <a:rPr lang="en-US" smtClean="0"/>
-              <a:t>6/19/16</a:t>
+              <a:t>6/20/16</a:t>
             </a:fld>
             <a:endParaRPr lang="en-US"/>
           </a:p>
@@ -597,7 +597,7 @@
           <a:p>
             <a:fld id="{0621BF35-B844-4EAB-BD7B-7E9CADDC35E5}" type="datetimeFigureOut">
               <a:rPr lang="en-US" smtClean="0"/>
-              <a:t>6/19/16</a:t>
+              <a:t>6/20/16</a:t>
             </a:fld>
             <a:endParaRPr lang="en-US"/>
           </a:p>
@@ -767,7 +767,7 @@
           <a:p>
             <a:fld id="{0621BF35-B844-4EAB-BD7B-7E9CADDC35E5}" type="datetimeFigureOut">
               <a:rPr lang="en-US" smtClean="0"/>
-              <a:t>6/19/16</a:t>
+              <a:t>6/20/16</a:t>
             </a:fld>
             <a:endParaRPr lang="en-US"/>
           </a:p>
@@ -1013,7 +1013,7 @@
           <a:p>
             <a:fld id="{0621BF35-B844-4EAB-BD7B-7E9CADDC35E5}" type="datetimeFigureOut">
               <a:rPr lang="en-US" smtClean="0"/>
-              <a:t>6/19/16</a:t>
+              <a:t>6/20/16</a:t>
             </a:fld>
             <a:endParaRPr lang="en-US"/>
           </a:p>
@@ -1245,7 +1245,7 @@
           <a:p>
             <a:fld id="{0621BF35-B844-4EAB-BD7B-7E9CADDC35E5}" type="datetimeFigureOut">
               <a:rPr lang="en-US" smtClean="0"/>
-              <a:t>6/19/16</a:t>
+              <a:t>6/20/16</a:t>
             </a:fld>
             <a:endParaRPr lang="en-US"/>
           </a:p>
@@ -1612,7 +1612,7 @@
           <a:p>
             <a:fld id="{0621BF35-B844-4EAB-BD7B-7E9CADDC35E5}" type="datetimeFigureOut">
               <a:rPr lang="en-US" smtClean="0"/>
-              <a:t>6/19/16</a:t>
+              <a:t>6/20/16</a:t>
             </a:fld>
             <a:endParaRPr lang="en-US"/>
           </a:p>
@@ -1730,7 +1730,7 @@
           <a:p>
             <a:fld id="{0621BF35-B844-4EAB-BD7B-7E9CADDC35E5}" type="datetimeFigureOut">
               <a:rPr lang="en-US" smtClean="0"/>
-              <a:t>6/19/16</a:t>
+              <a:t>6/20/16</a:t>
             </a:fld>
             <a:endParaRPr lang="en-US"/>
           </a:p>
@@ -1825,7 +1825,7 @@
           <a:p>
             <a:fld id="{0621BF35-B844-4EAB-BD7B-7E9CADDC35E5}" type="datetimeFigureOut">
               <a:rPr lang="en-US" smtClean="0"/>
-              <a:t>6/19/16</a:t>
+              <a:t>6/20/16</a:t>
             </a:fld>
             <a:endParaRPr lang="en-US"/>
           </a:p>
@@ -2102,7 +2102,7 @@
           <a:p>
             <a:fld id="{0621BF35-B844-4EAB-BD7B-7E9CADDC35E5}" type="datetimeFigureOut">
               <a:rPr lang="en-US" smtClean="0"/>
-              <a:t>6/19/16</a:t>
+              <a:t>6/20/16</a:t>
             </a:fld>
             <a:endParaRPr lang="en-US"/>
           </a:p>
@@ -2355,7 +2355,7 @@
           <a:p>
             <a:fld id="{0621BF35-B844-4EAB-BD7B-7E9CADDC35E5}" type="datetimeFigureOut">
               <a:rPr lang="en-US" smtClean="0"/>
-              <a:t>6/19/16</a:t>
+              <a:t>6/20/16</a:t>
             </a:fld>
             <a:endParaRPr lang="en-US"/>
           </a:p>
@@ -2568,7 +2568,7 @@
           <a:p>
             <a:fld id="{0621BF35-B844-4EAB-BD7B-7E9CADDC35E5}" type="datetimeFigureOut">
               <a:rPr lang="en-US" smtClean="0"/>
-              <a:t>6/19/16</a:t>
+              <a:t>6/20/16</a:t>
             </a:fld>
             <a:endParaRPr lang="en-US"/>
           </a:p>
@@ -2975,7 +2975,7 @@
       </p:grpSpPr>
       <p:grpSp>
         <p:nvGrpSpPr>
-          <p:cNvPr id="2" name="Group 1"/>
+          <p:cNvPr id="6" name="Group 5"/>
           <p:cNvGrpSpPr/>
           <p:nvPr/>
         </p:nvGrpSpPr>
@@ -2983,273 +2983,939 @@
           <a:xfrm>
             <a:off x="1840318" y="590109"/>
             <a:ext cx="5334045" cy="2902971"/>
-            <a:chOff x="3009900" y="770863"/>
+            <a:chOff x="1840318" y="590109"/>
             <a:chExt cx="5334045" cy="2902971"/>
           </a:xfrm>
         </p:grpSpPr>
         <p:grpSp>
           <p:nvGrpSpPr>
-            <p:cNvPr id="76" name="Group 75"/>
+            <p:cNvPr id="2" name="Group 1"/>
             <p:cNvGrpSpPr/>
             <p:nvPr/>
           </p:nvGrpSpPr>
           <p:grpSpPr>
             <a:xfrm>
-              <a:off x="3009900" y="770863"/>
+              <a:off x="1840318" y="590109"/>
               <a:ext cx="5334045" cy="2902971"/>
-              <a:chOff x="1505481" y="1427871"/>
+              <a:chOff x="3009900" y="770863"/>
               <a:chExt cx="5334045" cy="2902971"/>
             </a:xfrm>
           </p:grpSpPr>
+          <p:grpSp>
+            <p:nvGrpSpPr>
+              <p:cNvPr id="76" name="Group 75"/>
+              <p:cNvGrpSpPr/>
+              <p:nvPr/>
+            </p:nvGrpSpPr>
+            <p:grpSpPr>
+              <a:xfrm>
+                <a:off x="3009900" y="770863"/>
+                <a:ext cx="5334045" cy="2902971"/>
+                <a:chOff x="1505481" y="1427871"/>
+                <a:chExt cx="5334045" cy="2902971"/>
+              </a:xfrm>
+            </p:grpSpPr>
+            <p:sp>
+              <p:nvSpPr>
+                <p:cNvPr id="4" name="Rectangle 3"/>
+                <p:cNvSpPr/>
+                <p:nvPr/>
+              </p:nvSpPr>
+              <p:spPr>
+                <a:xfrm>
+                  <a:off x="3474721" y="1432560"/>
+                  <a:ext cx="1261640" cy="351693"/>
+                </a:xfrm>
+                <a:prstGeom prst="rect">
+                  <a:avLst/>
+                </a:prstGeom>
+                <a:solidFill>
+                  <a:schemeClr val="bg1"/>
+                </a:solidFill>
+                <a:ln>
+                  <a:solidFill>
+                    <a:schemeClr val="tx1"/>
+                  </a:solidFill>
+                </a:ln>
+              </p:spPr>
+              <p:style>
+                <a:lnRef idx="2">
+                  <a:schemeClr val="accent1">
+                    <a:shade val="50000"/>
+                  </a:schemeClr>
+                </a:lnRef>
+                <a:fillRef idx="1">
+                  <a:schemeClr val="accent1"/>
+                </a:fillRef>
+                <a:effectRef idx="0">
+                  <a:schemeClr val="accent1"/>
+                </a:effectRef>
+                <a:fontRef idx="minor">
+                  <a:schemeClr val="lt1"/>
+                </a:fontRef>
+              </p:style>
+              <p:txBody>
+                <a:bodyPr rtlCol="0" anchor="ctr"/>
+                <a:lstStyle/>
+                <a:p>
+                  <a:pPr algn="ctr"/>
+                  <a:r>
+                    <a:rPr lang="en-US" dirty="0" smtClean="0">
+                      <a:solidFill>
+                        <a:schemeClr val="tx1"/>
+                      </a:solidFill>
+                    </a:rPr>
+                    <a:t>Propane FE</a:t>
+                  </a:r>
+                  <a:endParaRPr lang="en-US" dirty="0">
+                    <a:solidFill>
+                      <a:schemeClr val="tx1"/>
+                    </a:solidFill>
+                  </a:endParaRPr>
+                </a:p>
+              </p:txBody>
+            </p:sp>
+            <p:sp>
+              <p:nvSpPr>
+                <p:cNvPr id="8" name="Rectangle 7"/>
+                <p:cNvSpPr/>
+                <p:nvPr/>
+              </p:nvSpPr>
+              <p:spPr>
+                <a:xfrm>
+                  <a:off x="3474721" y="2072535"/>
+                  <a:ext cx="1261640" cy="347889"/>
+                </a:xfrm>
+                <a:prstGeom prst="rect">
+                  <a:avLst/>
+                </a:prstGeom>
+                <a:solidFill>
+                  <a:schemeClr val="bg1"/>
+                </a:solidFill>
+                <a:ln>
+                  <a:solidFill>
+                    <a:schemeClr val="tx1"/>
+                  </a:solidFill>
+                </a:ln>
+              </p:spPr>
+              <p:style>
+                <a:lnRef idx="2">
+                  <a:schemeClr val="accent1">
+                    <a:shade val="50000"/>
+                  </a:schemeClr>
+                </a:lnRef>
+                <a:fillRef idx="1">
+                  <a:schemeClr val="accent1"/>
+                </a:fillRef>
+                <a:effectRef idx="0">
+                  <a:schemeClr val="accent1"/>
+                </a:effectRef>
+                <a:fontRef idx="minor">
+                  <a:schemeClr val="lt1"/>
+                </a:fontRef>
+              </p:style>
+              <p:txBody>
+                <a:bodyPr rtlCol="0" anchor="ctr"/>
+                <a:lstStyle/>
+                <a:p>
+                  <a:pPr algn="ctr"/>
+                  <a:r>
+                    <a:rPr lang="en-US" dirty="0" smtClean="0">
+                      <a:solidFill>
+                        <a:schemeClr val="tx1"/>
+                      </a:solidFill>
+                    </a:rPr>
+                    <a:t>RIR</a:t>
+                  </a:r>
+                  <a:endParaRPr lang="en-US" dirty="0">
+                    <a:solidFill>
+                      <a:schemeClr val="tx1"/>
+                    </a:solidFill>
+                  </a:endParaRPr>
+                </a:p>
+              </p:txBody>
+            </p:sp>
+            <p:sp>
+              <p:nvSpPr>
+                <p:cNvPr id="9" name="Rectangle 8"/>
+                <p:cNvSpPr/>
+                <p:nvPr/>
+              </p:nvSpPr>
+              <p:spPr>
+                <a:xfrm>
+                  <a:off x="3474721" y="2708707"/>
+                  <a:ext cx="1261640" cy="347889"/>
+                </a:xfrm>
+                <a:prstGeom prst="rect">
+                  <a:avLst/>
+                </a:prstGeom>
+                <a:solidFill>
+                  <a:schemeClr val="bg1"/>
+                </a:solidFill>
+                <a:ln>
+                  <a:solidFill>
+                    <a:schemeClr val="tx1"/>
+                  </a:solidFill>
+                </a:ln>
+              </p:spPr>
+              <p:style>
+                <a:lnRef idx="2">
+                  <a:schemeClr val="accent1">
+                    <a:shade val="50000"/>
+                  </a:schemeClr>
+                </a:lnRef>
+                <a:fillRef idx="1">
+                  <a:schemeClr val="accent1"/>
+                </a:fillRef>
+                <a:effectRef idx="0">
+                  <a:schemeClr val="accent1"/>
+                </a:effectRef>
+                <a:fontRef idx="minor">
+                  <a:schemeClr val="lt1"/>
+                </a:fontRef>
+              </p:style>
+              <p:txBody>
+                <a:bodyPr rtlCol="0" anchor="ctr"/>
+                <a:lstStyle/>
+                <a:p>
+                  <a:pPr algn="ctr"/>
+                  <a:r>
+                    <a:rPr lang="en-US" dirty="0" smtClean="0">
+                      <a:solidFill>
+                        <a:schemeClr val="tx1"/>
+                      </a:solidFill>
+                    </a:rPr>
+                    <a:t>PGIR</a:t>
+                  </a:r>
+                  <a:endParaRPr lang="en-US" dirty="0">
+                    <a:solidFill>
+                      <a:schemeClr val="tx1"/>
+                    </a:solidFill>
+                  </a:endParaRPr>
+                </a:p>
+              </p:txBody>
+            </p:sp>
+            <p:sp>
+              <p:nvSpPr>
+                <p:cNvPr id="11" name="Rectangle 10"/>
+                <p:cNvSpPr/>
+                <p:nvPr/>
+              </p:nvSpPr>
+              <p:spPr>
+                <a:xfrm>
+                  <a:off x="2200897" y="3956148"/>
+                  <a:ext cx="1069144" cy="374694"/>
+                </a:xfrm>
+                <a:prstGeom prst="rect">
+                  <a:avLst/>
+                </a:prstGeom>
+                <a:solidFill>
+                  <a:schemeClr val="bg1"/>
+                </a:solidFill>
+                <a:ln>
+                  <a:solidFill>
+                    <a:schemeClr val="tx1"/>
+                  </a:solidFill>
+                </a:ln>
+              </p:spPr>
+              <p:style>
+                <a:lnRef idx="2">
+                  <a:schemeClr val="accent1">
+                    <a:shade val="50000"/>
+                  </a:schemeClr>
+                </a:lnRef>
+                <a:fillRef idx="1">
+                  <a:schemeClr val="accent1"/>
+                </a:fillRef>
+                <a:effectRef idx="0">
+                  <a:schemeClr val="accent1"/>
+                </a:effectRef>
+                <a:fontRef idx="minor">
+                  <a:schemeClr val="lt1"/>
+                </a:fontRef>
+              </p:style>
+              <p:txBody>
+                <a:bodyPr rtlCol="0" anchor="ctr"/>
+                <a:lstStyle/>
+                <a:p>
+                  <a:pPr algn="ctr"/>
+                  <a:r>
+                    <a:rPr lang="en-US" dirty="0" smtClean="0">
+                      <a:solidFill>
+                        <a:schemeClr val="tx1"/>
+                      </a:solidFill>
+                    </a:rPr>
+                    <a:t>Quagga</a:t>
+                  </a:r>
+                  <a:endParaRPr lang="en-US" dirty="0">
+                    <a:solidFill>
+                      <a:schemeClr val="tx1"/>
+                    </a:solidFill>
+                  </a:endParaRPr>
+                </a:p>
+              </p:txBody>
+            </p:sp>
+            <p:sp>
+              <p:nvSpPr>
+                <p:cNvPr id="12" name="Rectangle 11"/>
+                <p:cNvSpPr/>
+                <p:nvPr/>
+              </p:nvSpPr>
+              <p:spPr>
+                <a:xfrm>
+                  <a:off x="3578665" y="3956147"/>
+                  <a:ext cx="1069144" cy="374694"/>
+                </a:xfrm>
+                <a:prstGeom prst="rect">
+                  <a:avLst/>
+                </a:prstGeom>
+                <a:solidFill>
+                  <a:schemeClr val="bg1"/>
+                </a:solidFill>
+                <a:ln>
+                  <a:solidFill>
+                    <a:schemeClr val="tx1"/>
+                  </a:solidFill>
+                </a:ln>
+              </p:spPr>
+              <p:style>
+                <a:lnRef idx="2">
+                  <a:schemeClr val="accent1">
+                    <a:shade val="50000"/>
+                  </a:schemeClr>
+                </a:lnRef>
+                <a:fillRef idx="1">
+                  <a:schemeClr val="accent1"/>
+                </a:fillRef>
+                <a:effectRef idx="0">
+                  <a:schemeClr val="accent1"/>
+                </a:effectRef>
+                <a:fontRef idx="minor">
+                  <a:schemeClr val="lt1"/>
+                </a:fontRef>
+              </p:style>
+              <p:txBody>
+                <a:bodyPr rtlCol="0" anchor="ctr"/>
+                <a:lstStyle/>
+                <a:p>
+                  <a:pPr algn="ctr"/>
+                  <a:r>
+                    <a:rPr lang="en-US" dirty="0" smtClean="0">
+                      <a:solidFill>
+                        <a:schemeClr val="tx1"/>
+                      </a:solidFill>
+                    </a:rPr>
+                    <a:t>Cisco</a:t>
+                  </a:r>
+                  <a:endParaRPr lang="en-US" dirty="0">
+                    <a:solidFill>
+                      <a:schemeClr val="tx1"/>
+                    </a:solidFill>
+                  </a:endParaRPr>
+                </a:p>
+              </p:txBody>
+            </p:sp>
+            <p:cxnSp>
+              <p:nvCxnSpPr>
+                <p:cNvPr id="14" name="Straight Arrow Connector 13"/>
+                <p:cNvCxnSpPr>
+                  <a:stCxn id="4" idx="2"/>
+                  <a:endCxn id="8" idx="0"/>
+                </p:cNvCxnSpPr>
+                <p:nvPr/>
+              </p:nvCxnSpPr>
+              <p:spPr>
+                <a:xfrm>
+                  <a:off x="4105541" y="1784253"/>
+                  <a:ext cx="0" cy="288282"/>
+                </a:xfrm>
+                <a:prstGeom prst="straightConnector1">
+                  <a:avLst/>
+                </a:prstGeom>
+                <a:ln w="38100">
+                  <a:solidFill>
+                    <a:schemeClr val="tx1"/>
+                  </a:solidFill>
+                  <a:tailEnd type="triangle"/>
+                </a:ln>
+              </p:spPr>
+              <p:style>
+                <a:lnRef idx="1">
+                  <a:schemeClr val="accent1"/>
+                </a:lnRef>
+                <a:fillRef idx="0">
+                  <a:schemeClr val="accent1"/>
+                </a:fillRef>
+                <a:effectRef idx="0">
+                  <a:schemeClr val="accent1"/>
+                </a:effectRef>
+                <a:fontRef idx="minor">
+                  <a:schemeClr val="tx1"/>
+                </a:fontRef>
+              </p:style>
+            </p:cxnSp>
+            <p:cxnSp>
+              <p:nvCxnSpPr>
+                <p:cNvPr id="15" name="Straight Arrow Connector 14"/>
+                <p:cNvCxnSpPr>
+                  <a:stCxn id="8" idx="2"/>
+                  <a:endCxn id="9" idx="0"/>
+                </p:cNvCxnSpPr>
+                <p:nvPr/>
+              </p:nvCxnSpPr>
+              <p:spPr>
+                <a:xfrm>
+                  <a:off x="4105541" y="2420424"/>
+                  <a:ext cx="0" cy="288283"/>
+                </a:xfrm>
+                <a:prstGeom prst="straightConnector1">
+                  <a:avLst/>
+                </a:prstGeom>
+                <a:ln w="38100">
+                  <a:solidFill>
+                    <a:schemeClr val="tx1"/>
+                  </a:solidFill>
+                  <a:tailEnd type="triangle"/>
+                </a:ln>
+              </p:spPr>
+              <p:style>
+                <a:lnRef idx="1">
+                  <a:schemeClr val="accent1"/>
+                </a:lnRef>
+                <a:fillRef idx="0">
+                  <a:schemeClr val="accent1"/>
+                </a:fillRef>
+                <a:effectRef idx="0">
+                  <a:schemeClr val="accent1"/>
+                </a:effectRef>
+                <a:fontRef idx="minor">
+                  <a:schemeClr val="tx1"/>
+                </a:fontRef>
+              </p:style>
+            </p:cxnSp>
+            <p:cxnSp>
+              <p:nvCxnSpPr>
+                <p:cNvPr id="16" name="Straight Arrow Connector 15"/>
+                <p:cNvCxnSpPr>
+                  <a:stCxn id="9" idx="2"/>
+                </p:cNvCxnSpPr>
+                <p:nvPr/>
+              </p:nvCxnSpPr>
+              <p:spPr>
+                <a:xfrm>
+                  <a:off x="4105541" y="3056596"/>
+                  <a:ext cx="0" cy="302351"/>
+                </a:xfrm>
+                <a:prstGeom prst="straightConnector1">
+                  <a:avLst/>
+                </a:prstGeom>
+                <a:ln w="38100">
+                  <a:solidFill>
+                    <a:schemeClr val="tx1"/>
+                  </a:solidFill>
+                  <a:tailEnd type="triangle"/>
+                </a:ln>
+              </p:spPr>
+              <p:style>
+                <a:lnRef idx="1">
+                  <a:schemeClr val="accent1"/>
+                </a:lnRef>
+                <a:fillRef idx="0">
+                  <a:schemeClr val="accent1"/>
+                </a:fillRef>
+                <a:effectRef idx="0">
+                  <a:schemeClr val="accent1"/>
+                </a:effectRef>
+                <a:fontRef idx="minor">
+                  <a:schemeClr val="tx1"/>
+                </a:fontRef>
+              </p:style>
+            </p:cxnSp>
+            <p:cxnSp>
+              <p:nvCxnSpPr>
+                <p:cNvPr id="17" name="Straight Arrow Connector 16"/>
+                <p:cNvCxnSpPr/>
+                <p:nvPr/>
+              </p:nvCxnSpPr>
+              <p:spPr>
+                <a:xfrm flipH="1">
+                  <a:off x="3268201" y="3706836"/>
+                  <a:ext cx="837340" cy="249311"/>
+                </a:xfrm>
+                <a:prstGeom prst="straightConnector1">
+                  <a:avLst/>
+                </a:prstGeom>
+                <a:ln w="38100">
+                  <a:solidFill>
+                    <a:schemeClr val="tx1"/>
+                  </a:solidFill>
+                  <a:prstDash val="solid"/>
+                  <a:tailEnd type="triangle"/>
+                </a:ln>
+              </p:spPr>
+              <p:style>
+                <a:lnRef idx="1">
+                  <a:schemeClr val="accent1"/>
+                </a:lnRef>
+                <a:fillRef idx="0">
+                  <a:schemeClr val="accent1"/>
+                </a:fillRef>
+                <a:effectRef idx="0">
+                  <a:schemeClr val="accent1"/>
+                </a:effectRef>
+                <a:fontRef idx="minor">
+                  <a:schemeClr val="tx1"/>
+                </a:fontRef>
+              </p:style>
+            </p:cxnSp>
+            <p:cxnSp>
+              <p:nvCxnSpPr>
+                <p:cNvPr id="21" name="Straight Arrow Connector 20"/>
+                <p:cNvCxnSpPr>
+                  <a:endCxn id="12" idx="0"/>
+                </p:cNvCxnSpPr>
+                <p:nvPr/>
+              </p:nvCxnSpPr>
+              <p:spPr>
+                <a:xfrm>
+                  <a:off x="4105541" y="3706836"/>
+                  <a:ext cx="7696" cy="249311"/>
+                </a:xfrm>
+                <a:prstGeom prst="straightConnector1">
+                  <a:avLst/>
+                </a:prstGeom>
+                <a:ln w="38100">
+                  <a:solidFill>
+                    <a:schemeClr val="tx1"/>
+                  </a:solidFill>
+                  <a:prstDash val="solid"/>
+                  <a:tailEnd type="triangle"/>
+                </a:ln>
+              </p:spPr>
+              <p:style>
+                <a:lnRef idx="1">
+                  <a:schemeClr val="accent1"/>
+                </a:lnRef>
+                <a:fillRef idx="0">
+                  <a:schemeClr val="accent1"/>
+                </a:fillRef>
+                <a:effectRef idx="0">
+                  <a:schemeClr val="accent1"/>
+                </a:effectRef>
+                <a:fontRef idx="minor">
+                  <a:schemeClr val="tx1"/>
+                </a:fontRef>
+              </p:style>
+            </p:cxnSp>
+            <p:sp>
+              <p:nvSpPr>
+                <p:cNvPr id="27" name="TextBox 26"/>
+                <p:cNvSpPr txBox="1"/>
+                <p:nvPr/>
+              </p:nvSpPr>
+              <p:spPr>
+                <a:xfrm>
+                  <a:off x="4837824" y="2561517"/>
+                  <a:ext cx="2001702" cy="646331"/>
+                </a:xfrm>
+                <a:prstGeom prst="rect">
+                  <a:avLst/>
+                </a:prstGeom>
+                <a:noFill/>
+              </p:spPr>
+              <p:txBody>
+                <a:bodyPr wrap="none" rtlCol="0">
+                  <a:spAutoFit/>
+                </a:bodyPr>
+                <a:lstStyle/>
+                <a:p>
+                  <a:r>
+                    <a:rPr lang="en-US" dirty="0" smtClean="0">
+                      <a:solidFill>
+                        <a:schemeClr val="tx1">
+                          <a:lumMod val="50000"/>
+                          <a:lumOff val="50000"/>
+                        </a:schemeClr>
+                      </a:solidFill>
+                    </a:rPr>
+                    <a:t>BGP Control Graph</a:t>
+                  </a:r>
+                </a:p>
+                <a:p>
+                  <a:r>
+                    <a:rPr lang="en-US" dirty="0" smtClean="0">
+                      <a:solidFill>
+                        <a:schemeClr val="tx1">
+                          <a:lumMod val="50000"/>
+                          <a:lumOff val="50000"/>
+                        </a:schemeClr>
+                      </a:solidFill>
+                    </a:rPr>
+                    <a:t>Safety Analysis</a:t>
+                  </a:r>
+                  <a:endParaRPr lang="en-US" dirty="0">
+                    <a:solidFill>
+                      <a:schemeClr val="tx1">
+                        <a:lumMod val="50000"/>
+                        <a:lumOff val="50000"/>
+                      </a:schemeClr>
+                    </a:solidFill>
+                  </a:endParaRPr>
+                </a:p>
+              </p:txBody>
+            </p:sp>
+            <p:sp>
+              <p:nvSpPr>
+                <p:cNvPr id="28" name="Rectangle 27"/>
+                <p:cNvSpPr/>
+                <p:nvPr/>
+              </p:nvSpPr>
+              <p:spPr>
+                <a:xfrm>
+                  <a:off x="1992537" y="2708707"/>
+                  <a:ext cx="1069144" cy="347889"/>
+                </a:xfrm>
+                <a:prstGeom prst="rect">
+                  <a:avLst/>
+                </a:prstGeom>
+                <a:solidFill>
+                  <a:schemeClr val="bg1"/>
+                </a:solidFill>
+                <a:ln>
+                  <a:solidFill>
+                    <a:schemeClr val="tx1"/>
+                  </a:solidFill>
+                </a:ln>
+              </p:spPr>
+              <p:style>
+                <a:lnRef idx="2">
+                  <a:schemeClr val="accent1">
+                    <a:shade val="50000"/>
+                  </a:schemeClr>
+                </a:lnRef>
+                <a:fillRef idx="1">
+                  <a:schemeClr val="accent1"/>
+                </a:fillRef>
+                <a:effectRef idx="0">
+                  <a:schemeClr val="accent1"/>
+                </a:effectRef>
+                <a:fontRef idx="minor">
+                  <a:schemeClr val="lt1"/>
+                </a:fontRef>
+              </p:style>
+              <p:txBody>
+                <a:bodyPr rtlCol="0" anchor="ctr"/>
+                <a:lstStyle/>
+                <a:p>
+                  <a:pPr algn="ctr"/>
+                  <a:r>
+                    <a:rPr lang="en-US" dirty="0" smtClean="0">
+                      <a:solidFill>
+                        <a:schemeClr val="tx1"/>
+                      </a:solidFill>
+                    </a:rPr>
+                    <a:t>Topology</a:t>
+                  </a:r>
+                  <a:endParaRPr lang="en-US" dirty="0">
+                    <a:solidFill>
+                      <a:schemeClr val="tx1"/>
+                    </a:solidFill>
+                  </a:endParaRPr>
+                </a:p>
+              </p:txBody>
+            </p:sp>
+            <p:cxnSp>
+              <p:nvCxnSpPr>
+                <p:cNvPr id="29" name="Straight Arrow Connector 28"/>
+                <p:cNvCxnSpPr>
+                  <a:stCxn id="28" idx="3"/>
+                  <a:endCxn id="9" idx="1"/>
+                </p:cNvCxnSpPr>
+                <p:nvPr/>
+              </p:nvCxnSpPr>
+              <p:spPr>
+                <a:xfrm>
+                  <a:off x="3061681" y="2882652"/>
+                  <a:ext cx="413040" cy="0"/>
+                </a:xfrm>
+                <a:prstGeom prst="straightConnector1">
+                  <a:avLst/>
+                </a:prstGeom>
+                <a:ln w="38100">
+                  <a:solidFill>
+                    <a:schemeClr val="tx1"/>
+                  </a:solidFill>
+                  <a:tailEnd type="triangle"/>
+                </a:ln>
+              </p:spPr>
+              <p:style>
+                <a:lnRef idx="1">
+                  <a:schemeClr val="accent1"/>
+                </a:lnRef>
+                <a:fillRef idx="0">
+                  <a:schemeClr val="accent1"/>
+                </a:fillRef>
+                <a:effectRef idx="0">
+                  <a:schemeClr val="accent1"/>
+                </a:effectRef>
+                <a:fontRef idx="minor">
+                  <a:schemeClr val="tx1"/>
+                </a:fontRef>
+              </p:style>
+            </p:cxnSp>
+            <p:sp>
+              <p:nvSpPr>
+                <p:cNvPr id="32" name="Rectangle 31"/>
+                <p:cNvSpPr/>
+                <p:nvPr/>
+              </p:nvSpPr>
+              <p:spPr>
+                <a:xfrm>
+                  <a:off x="1505481" y="1427871"/>
+                  <a:ext cx="1683200" cy="351693"/>
+                </a:xfrm>
+                <a:prstGeom prst="rect">
+                  <a:avLst/>
+                </a:prstGeom>
+                <a:solidFill>
+                  <a:schemeClr val="bg1"/>
+                </a:solidFill>
+                <a:ln>
+                  <a:solidFill>
+                    <a:schemeClr val="tx1"/>
+                  </a:solidFill>
+                </a:ln>
+              </p:spPr>
+              <p:style>
+                <a:lnRef idx="2">
+                  <a:schemeClr val="accent1">
+                    <a:shade val="50000"/>
+                  </a:schemeClr>
+                </a:lnRef>
+                <a:fillRef idx="1">
+                  <a:schemeClr val="accent1"/>
+                </a:fillRef>
+                <a:effectRef idx="0">
+                  <a:schemeClr val="accent1"/>
+                </a:effectRef>
+                <a:fontRef idx="minor">
+                  <a:schemeClr val="lt1"/>
+                </a:fontRef>
+              </p:style>
+              <p:txBody>
+                <a:bodyPr rtlCol="0" anchor="ctr"/>
+                <a:lstStyle/>
+                <a:p>
+                  <a:pPr algn="ctr"/>
+                  <a:r>
+                    <a:rPr lang="en-US" dirty="0" smtClean="0">
+                      <a:solidFill>
+                        <a:schemeClr val="tx1"/>
+                      </a:solidFill>
+                    </a:rPr>
+                    <a:t>Network Policy</a:t>
+                  </a:r>
+                  <a:endParaRPr lang="en-US" dirty="0">
+                    <a:solidFill>
+                      <a:schemeClr val="tx1"/>
+                    </a:solidFill>
+                  </a:endParaRPr>
+                </a:p>
+              </p:txBody>
+            </p:sp>
+            <p:cxnSp>
+              <p:nvCxnSpPr>
+                <p:cNvPr id="33" name="Straight Arrow Connector 32"/>
+                <p:cNvCxnSpPr>
+                  <a:stCxn id="32" idx="3"/>
+                  <a:endCxn id="4" idx="1"/>
+                </p:cNvCxnSpPr>
+                <p:nvPr/>
+              </p:nvCxnSpPr>
+              <p:spPr>
+                <a:xfrm>
+                  <a:off x="3188681" y="1603718"/>
+                  <a:ext cx="286040" cy="4689"/>
+                </a:xfrm>
+                <a:prstGeom prst="straightConnector1">
+                  <a:avLst/>
+                </a:prstGeom>
+                <a:ln w="38100">
+                  <a:solidFill>
+                    <a:schemeClr val="tx1"/>
+                  </a:solidFill>
+                  <a:tailEnd type="triangle"/>
+                </a:ln>
+              </p:spPr>
+              <p:style>
+                <a:lnRef idx="1">
+                  <a:schemeClr val="accent1"/>
+                </a:lnRef>
+                <a:fillRef idx="0">
+                  <a:schemeClr val="accent1"/>
+                </a:fillRef>
+                <a:effectRef idx="0">
+                  <a:schemeClr val="accent1"/>
+                </a:effectRef>
+                <a:fontRef idx="minor">
+                  <a:schemeClr val="tx1"/>
+                </a:fontRef>
+              </p:style>
+            </p:cxnSp>
+            <p:sp>
+              <p:nvSpPr>
+                <p:cNvPr id="34" name="TextBox 33"/>
+                <p:cNvSpPr txBox="1"/>
+                <p:nvPr/>
+              </p:nvSpPr>
+              <p:spPr>
+                <a:xfrm>
+                  <a:off x="4830908" y="3212825"/>
+                  <a:ext cx="1944571" cy="646331"/>
+                </a:xfrm>
+                <a:prstGeom prst="rect">
+                  <a:avLst/>
+                </a:prstGeom>
+                <a:noFill/>
+              </p:spPr>
+              <p:txBody>
+                <a:bodyPr wrap="none" rtlCol="0">
+                  <a:spAutoFit/>
+                </a:bodyPr>
+                <a:lstStyle/>
+                <a:p>
+                  <a:r>
+                    <a:rPr lang="en-US" dirty="0" err="1" smtClean="0">
+                      <a:solidFill>
+                        <a:schemeClr val="tx1">
+                          <a:lumMod val="50000"/>
+                          <a:lumOff val="50000"/>
+                        </a:schemeClr>
+                      </a:solidFill>
+                    </a:rPr>
+                    <a:t>Config</a:t>
+                  </a:r>
+                  <a:r>
+                    <a:rPr lang="en-US" dirty="0" smtClean="0">
+                      <a:solidFill>
+                        <a:schemeClr val="tx1">
+                          <a:lumMod val="50000"/>
+                          <a:lumOff val="50000"/>
+                        </a:schemeClr>
+                      </a:solidFill>
+                    </a:rPr>
+                    <a:t> Generation </a:t>
+                  </a:r>
+                  <a:br>
+                    <a:rPr lang="en-US" dirty="0" smtClean="0">
+                      <a:solidFill>
+                        <a:schemeClr val="tx1">
+                          <a:lumMod val="50000"/>
+                          <a:lumOff val="50000"/>
+                        </a:schemeClr>
+                      </a:solidFill>
+                    </a:rPr>
+                  </a:br>
+                  <a:r>
+                    <a:rPr lang="en-US" dirty="0" smtClean="0">
+                      <a:solidFill>
+                        <a:schemeClr val="tx1">
+                          <a:lumMod val="50000"/>
+                          <a:lumOff val="50000"/>
+                        </a:schemeClr>
+                      </a:solidFill>
+                    </a:rPr>
+                    <a:t>+ Minimization</a:t>
+                  </a:r>
+                  <a:endParaRPr lang="en-US" dirty="0">
+                    <a:solidFill>
+                      <a:schemeClr val="tx1">
+                        <a:lumMod val="50000"/>
+                        <a:lumOff val="50000"/>
+                      </a:schemeClr>
+                    </a:solidFill>
+                  </a:endParaRPr>
+                </a:p>
+              </p:txBody>
+            </p:sp>
+            <p:sp>
+              <p:nvSpPr>
+                <p:cNvPr id="62" name="TextBox 61"/>
+                <p:cNvSpPr txBox="1"/>
+                <p:nvPr/>
+              </p:nvSpPr>
+              <p:spPr>
+                <a:xfrm>
+                  <a:off x="4837824" y="1925268"/>
+                  <a:ext cx="1899879" cy="646331"/>
+                </a:xfrm>
+                <a:prstGeom prst="rect">
+                  <a:avLst/>
+                </a:prstGeom>
+                <a:noFill/>
+              </p:spPr>
+              <p:txBody>
+                <a:bodyPr wrap="none" rtlCol="0">
+                  <a:spAutoFit/>
+                </a:bodyPr>
+                <a:lstStyle/>
+                <a:p>
+                  <a:r>
+                    <a:rPr lang="en-US" dirty="0" smtClean="0">
+                      <a:solidFill>
+                        <a:schemeClr val="tx1">
+                          <a:lumMod val="50000"/>
+                          <a:lumOff val="50000"/>
+                        </a:schemeClr>
+                      </a:solidFill>
+                    </a:rPr>
+                    <a:t>Rewriting Rules + </a:t>
+                  </a:r>
+                </a:p>
+                <a:p>
+                  <a:r>
+                    <a:rPr lang="en-US" dirty="0" smtClean="0">
+                      <a:solidFill>
+                        <a:schemeClr val="tx1">
+                          <a:lumMod val="50000"/>
+                          <a:lumOff val="50000"/>
+                        </a:schemeClr>
+                      </a:solidFill>
+                    </a:rPr>
+                    <a:t>Well-</a:t>
+                  </a:r>
+                  <a:r>
+                    <a:rPr lang="en-US" dirty="0" err="1" smtClean="0">
+                      <a:solidFill>
+                        <a:schemeClr val="tx1">
+                          <a:lumMod val="50000"/>
+                          <a:lumOff val="50000"/>
+                        </a:schemeClr>
+                      </a:solidFill>
+                    </a:rPr>
+                    <a:t>Formedness</a:t>
+                  </a:r>
+                  <a:endParaRPr lang="en-US" dirty="0">
+                    <a:solidFill>
+                      <a:schemeClr val="tx1">
+                        <a:lumMod val="50000"/>
+                        <a:lumOff val="50000"/>
+                      </a:schemeClr>
+                    </a:solidFill>
+                  </a:endParaRPr>
+                </a:p>
+              </p:txBody>
+            </p:sp>
+          </p:grpSp>
           <p:sp>
             <p:nvSpPr>
-              <p:cNvPr id="4" name="Rectangle 3"/>
+              <p:cNvPr id="22" name="Rectangle 21"/>
               <p:cNvSpPr/>
               <p:nvPr/>
             </p:nvSpPr>
             <p:spPr>
               <a:xfrm>
-                <a:off x="3474721" y="1432560"/>
-                <a:ext cx="1261640" cy="351693"/>
-              </a:xfrm>
-              <a:prstGeom prst="rect">
-                <a:avLst/>
-              </a:prstGeom>
-              <a:solidFill>
-                <a:schemeClr val="bg1"/>
-              </a:solidFill>
-              <a:ln>
-                <a:solidFill>
-                  <a:schemeClr val="tx1"/>
-                </a:solidFill>
-              </a:ln>
-            </p:spPr>
-            <p:style>
-              <a:lnRef idx="2">
-                <a:schemeClr val="accent1">
-                  <a:shade val="50000"/>
-                </a:schemeClr>
-              </a:lnRef>
-              <a:fillRef idx="1">
-                <a:schemeClr val="accent1"/>
-              </a:fillRef>
-              <a:effectRef idx="0">
-                <a:schemeClr val="accent1"/>
-              </a:effectRef>
-              <a:fontRef idx="minor">
-                <a:schemeClr val="lt1"/>
-              </a:fontRef>
-            </p:style>
-            <p:txBody>
-              <a:bodyPr rtlCol="0" anchor="ctr"/>
-              <a:lstStyle/>
-              <a:p>
-                <a:pPr algn="ctr"/>
-                <a:r>
-                  <a:rPr lang="en-US" dirty="0" smtClean="0">
-                    <a:solidFill>
-                      <a:schemeClr val="tx1"/>
-                    </a:solidFill>
-                  </a:rPr>
-                  <a:t>Propane FE</a:t>
-                </a:r>
-                <a:endParaRPr lang="en-US" dirty="0">
-                  <a:solidFill>
-                    <a:schemeClr val="tx1"/>
-                  </a:solidFill>
-                </a:endParaRPr>
-              </a:p>
-            </p:txBody>
-          </p:sp>
-          <p:sp>
-            <p:nvSpPr>
-              <p:cNvPr id="8" name="Rectangle 7"/>
-              <p:cNvSpPr/>
-              <p:nvPr/>
-            </p:nvSpPr>
-            <p:spPr>
-              <a:xfrm>
-                <a:off x="3474721" y="2072535"/>
-                <a:ext cx="1261640" cy="347889"/>
-              </a:xfrm>
-              <a:prstGeom prst="rect">
-                <a:avLst/>
-              </a:prstGeom>
-              <a:solidFill>
-                <a:schemeClr val="bg1"/>
-              </a:solidFill>
-              <a:ln>
-                <a:solidFill>
-                  <a:schemeClr val="tx1"/>
-                </a:solidFill>
-              </a:ln>
-            </p:spPr>
-            <p:style>
-              <a:lnRef idx="2">
-                <a:schemeClr val="accent1">
-                  <a:shade val="50000"/>
-                </a:schemeClr>
-              </a:lnRef>
-              <a:fillRef idx="1">
-                <a:schemeClr val="accent1"/>
-              </a:fillRef>
-              <a:effectRef idx="0">
-                <a:schemeClr val="accent1"/>
-              </a:effectRef>
-              <a:fontRef idx="minor">
-                <a:schemeClr val="lt1"/>
-              </a:fontRef>
-            </p:style>
-            <p:txBody>
-              <a:bodyPr rtlCol="0" anchor="ctr"/>
-              <a:lstStyle/>
-              <a:p>
-                <a:pPr algn="ctr"/>
-                <a:r>
-                  <a:rPr lang="en-US" dirty="0" smtClean="0">
-                    <a:solidFill>
-                      <a:schemeClr val="tx1"/>
-                    </a:solidFill>
-                  </a:rPr>
-                  <a:t>RIR</a:t>
-                </a:r>
-                <a:endParaRPr lang="en-US" dirty="0">
-                  <a:solidFill>
-                    <a:schemeClr val="tx1"/>
-                  </a:solidFill>
-                </a:endParaRPr>
-              </a:p>
-            </p:txBody>
-          </p:sp>
-          <p:sp>
-            <p:nvSpPr>
-              <p:cNvPr id="9" name="Rectangle 8"/>
-              <p:cNvSpPr/>
-              <p:nvPr/>
-            </p:nvSpPr>
-            <p:spPr>
-              <a:xfrm>
-                <a:off x="3474721" y="2708707"/>
-                <a:ext cx="1261640" cy="347889"/>
-              </a:xfrm>
-              <a:prstGeom prst="rect">
-                <a:avLst/>
-              </a:prstGeom>
-              <a:solidFill>
-                <a:schemeClr val="bg1"/>
-              </a:solidFill>
-              <a:ln>
-                <a:solidFill>
-                  <a:schemeClr val="tx1"/>
-                </a:solidFill>
-              </a:ln>
-            </p:spPr>
-            <p:style>
-              <a:lnRef idx="2">
-                <a:schemeClr val="accent1">
-                  <a:shade val="50000"/>
-                </a:schemeClr>
-              </a:lnRef>
-              <a:fillRef idx="1">
-                <a:schemeClr val="accent1"/>
-              </a:fillRef>
-              <a:effectRef idx="0">
-                <a:schemeClr val="accent1"/>
-              </a:effectRef>
-              <a:fontRef idx="minor">
-                <a:schemeClr val="lt1"/>
-              </a:fontRef>
-            </p:style>
-            <p:txBody>
-              <a:bodyPr rtlCol="0" anchor="ctr"/>
-              <a:lstStyle/>
-              <a:p>
-                <a:pPr algn="ctr"/>
-                <a:r>
-                  <a:rPr lang="en-US" dirty="0" smtClean="0">
-                    <a:solidFill>
-                      <a:schemeClr val="tx1"/>
-                    </a:solidFill>
-                  </a:rPr>
-                  <a:t>PGIR</a:t>
-                </a:r>
-                <a:endParaRPr lang="en-US" dirty="0">
-                  <a:solidFill>
-                    <a:schemeClr val="tx1"/>
-                  </a:solidFill>
-                </a:endParaRPr>
-              </a:p>
-            </p:txBody>
-          </p:sp>
-          <p:sp>
-            <p:nvSpPr>
-              <p:cNvPr id="10" name="Rectangle 9"/>
-              <p:cNvSpPr/>
-              <p:nvPr/>
-            </p:nvSpPr>
-            <p:spPr>
-              <a:xfrm>
-                <a:off x="3474721" y="3358947"/>
-                <a:ext cx="1261640" cy="347889"/>
-              </a:xfrm>
-              <a:prstGeom prst="rect">
-                <a:avLst/>
-              </a:prstGeom>
-              <a:solidFill>
-                <a:schemeClr val="bg1"/>
-              </a:solidFill>
-              <a:ln>
-                <a:solidFill>
-                  <a:schemeClr val="tx1"/>
-                </a:solidFill>
-              </a:ln>
-            </p:spPr>
-            <p:style>
-              <a:lnRef idx="2">
-                <a:schemeClr val="accent1">
-                  <a:shade val="50000"/>
-                </a:schemeClr>
-              </a:lnRef>
-              <a:fillRef idx="1">
-                <a:schemeClr val="accent1"/>
-              </a:fillRef>
-              <a:effectRef idx="0">
-                <a:schemeClr val="accent1"/>
-              </a:effectRef>
-              <a:fontRef idx="minor">
-                <a:schemeClr val="lt1"/>
-              </a:fontRef>
-            </p:style>
-            <p:txBody>
-              <a:bodyPr rtlCol="0" anchor="ctr"/>
-              <a:lstStyle/>
-              <a:p>
-                <a:pPr algn="ctr"/>
-                <a:r>
-                  <a:rPr lang="en-US" dirty="0" smtClean="0">
-                    <a:solidFill>
-                      <a:schemeClr val="tx1"/>
-                    </a:solidFill>
-                  </a:rPr>
-                  <a:t>ABGP</a:t>
-                </a:r>
-                <a:endParaRPr lang="en-US" dirty="0">
-                  <a:solidFill>
-                    <a:schemeClr val="tx1"/>
-                  </a:solidFill>
-                </a:endParaRPr>
-              </a:p>
-            </p:txBody>
-          </p:sp>
-          <p:sp>
-            <p:nvSpPr>
-              <p:cNvPr id="11" name="Rectangle 10"/>
-              <p:cNvSpPr/>
-              <p:nvPr/>
-            </p:nvSpPr>
-            <p:spPr>
-              <a:xfrm>
-                <a:off x="2200897" y="3956148"/>
+                <a:off x="6466462" y="3299139"/>
                 <a:ext cx="1069144" cy="374694"/>
               </a:xfrm>
               <a:prstGeom prst="rect">
@@ -3286,72 +3952,12 @@
               <a:p>
                 <a:pPr algn="ctr"/>
                 <a:r>
-                  <a:rPr lang="en-US" dirty="0" smtClean="0">
+                  <a:rPr lang="is-IS" dirty="0" smtClean="0">
                     <a:solidFill>
                       <a:schemeClr val="tx1"/>
                     </a:solidFill>
                   </a:rPr>
-                  <a:t>Quagga</a:t>
-                </a:r>
-                <a:endParaRPr lang="en-US" dirty="0">
-                  <a:solidFill>
-                    <a:schemeClr val="tx1"/>
-                  </a:solidFill>
-                </a:endParaRPr>
-              </a:p>
-            </p:txBody>
-          </p:sp>
-          <p:sp>
-            <p:nvSpPr>
-              <p:cNvPr id="12" name="Rectangle 11"/>
-              <p:cNvSpPr/>
-              <p:nvPr/>
-            </p:nvSpPr>
-            <p:spPr>
-              <a:xfrm>
-                <a:off x="3578665" y="3956147"/>
-                <a:ext cx="1069144" cy="374694"/>
-              </a:xfrm>
-              <a:prstGeom prst="rect">
-                <a:avLst/>
-              </a:prstGeom>
-              <a:solidFill>
-                <a:schemeClr val="bg1"/>
-              </a:solidFill>
-              <a:ln>
-                <a:solidFill>
-                  <a:schemeClr val="tx1"/>
-                </a:solidFill>
-              </a:ln>
-            </p:spPr>
-            <p:style>
-              <a:lnRef idx="2">
-                <a:schemeClr val="accent1">
-                  <a:shade val="50000"/>
-                </a:schemeClr>
-              </a:lnRef>
-              <a:fillRef idx="1">
-                <a:schemeClr val="accent1"/>
-              </a:fillRef>
-              <a:effectRef idx="0">
-                <a:schemeClr val="accent1"/>
-              </a:effectRef>
-              <a:fontRef idx="minor">
-                <a:schemeClr val="lt1"/>
-              </a:fontRef>
-            </p:style>
-            <p:txBody>
-              <a:bodyPr rtlCol="0" anchor="ctr"/>
-              <a:lstStyle/>
-              <a:p>
-                <a:pPr algn="ctr"/>
-                <a:r>
-                  <a:rPr lang="en-US" dirty="0" smtClean="0">
-                    <a:solidFill>
-                      <a:schemeClr val="tx1"/>
-                    </a:solidFill>
-                  </a:rPr>
-                  <a:t>Cisco</a:t>
+                  <a:t>…</a:t>
                 </a:r>
                 <a:endParaRPr lang="en-US" dirty="0">
                   <a:solidFill>
@@ -3363,133 +3969,14 @@
           </p:sp>
           <p:cxnSp>
             <p:nvCxnSpPr>
-              <p:cNvPr id="14" name="Straight Arrow Connector 13"/>
-              <p:cNvCxnSpPr>
-                <a:stCxn id="4" idx="2"/>
-                <a:endCxn id="8" idx="0"/>
-              </p:cNvCxnSpPr>
+              <p:cNvPr id="26" name="Straight Arrow Connector 25"/>
+              <p:cNvCxnSpPr/>
               <p:nvPr/>
             </p:nvCxnSpPr>
             <p:spPr>
               <a:xfrm>
-                <a:off x="4105541" y="1784253"/>
-                <a:ext cx="0" cy="288282"/>
-              </a:xfrm>
-              <a:prstGeom prst="straightConnector1">
-                <a:avLst/>
-              </a:prstGeom>
-              <a:ln w="38100">
-                <a:solidFill>
-                  <a:schemeClr val="tx1"/>
-                </a:solidFill>
-                <a:tailEnd type="triangle"/>
-              </a:ln>
-            </p:spPr>
-            <p:style>
-              <a:lnRef idx="1">
-                <a:schemeClr val="accent1"/>
-              </a:lnRef>
-              <a:fillRef idx="0">
-                <a:schemeClr val="accent1"/>
-              </a:fillRef>
-              <a:effectRef idx="0">
-                <a:schemeClr val="accent1"/>
-              </a:effectRef>
-              <a:fontRef idx="minor">
-                <a:schemeClr val="tx1"/>
-              </a:fontRef>
-            </p:style>
-          </p:cxnSp>
-          <p:cxnSp>
-            <p:nvCxnSpPr>
-              <p:cNvPr id="15" name="Straight Arrow Connector 14"/>
-              <p:cNvCxnSpPr>
-                <a:stCxn id="8" idx="2"/>
-                <a:endCxn id="9" idx="0"/>
-              </p:cNvCxnSpPr>
-              <p:nvPr/>
-            </p:nvCxnSpPr>
-            <p:spPr>
-              <a:xfrm>
-                <a:off x="4105541" y="2420424"/>
-                <a:ext cx="0" cy="288283"/>
-              </a:xfrm>
-              <a:prstGeom prst="straightConnector1">
-                <a:avLst/>
-              </a:prstGeom>
-              <a:ln w="38100">
-                <a:solidFill>
-                  <a:schemeClr val="tx1"/>
-                </a:solidFill>
-                <a:tailEnd type="triangle"/>
-              </a:ln>
-            </p:spPr>
-            <p:style>
-              <a:lnRef idx="1">
-                <a:schemeClr val="accent1"/>
-              </a:lnRef>
-              <a:fillRef idx="0">
-                <a:schemeClr val="accent1"/>
-              </a:fillRef>
-              <a:effectRef idx="0">
-                <a:schemeClr val="accent1"/>
-              </a:effectRef>
-              <a:fontRef idx="minor">
-                <a:schemeClr val="tx1"/>
-              </a:fontRef>
-            </p:style>
-          </p:cxnSp>
-          <p:cxnSp>
-            <p:nvCxnSpPr>
-              <p:cNvPr id="16" name="Straight Arrow Connector 15"/>
-              <p:cNvCxnSpPr>
-                <a:stCxn id="9" idx="2"/>
-                <a:endCxn id="10" idx="0"/>
-              </p:cNvCxnSpPr>
-              <p:nvPr/>
-            </p:nvCxnSpPr>
-            <p:spPr>
-              <a:xfrm>
-                <a:off x="4105541" y="3056596"/>
-                <a:ext cx="0" cy="302351"/>
-              </a:xfrm>
-              <a:prstGeom prst="straightConnector1">
-                <a:avLst/>
-              </a:prstGeom>
-              <a:ln w="38100">
-                <a:solidFill>
-                  <a:schemeClr val="tx1"/>
-                </a:solidFill>
-                <a:tailEnd type="triangle"/>
-              </a:ln>
-            </p:spPr>
-            <p:style>
-              <a:lnRef idx="1">
-                <a:schemeClr val="accent1"/>
-              </a:lnRef>
-              <a:fillRef idx="0">
-                <a:schemeClr val="accent1"/>
-              </a:fillRef>
-              <a:effectRef idx="0">
-                <a:schemeClr val="accent1"/>
-              </a:effectRef>
-              <a:fontRef idx="minor">
-                <a:schemeClr val="tx1"/>
-              </a:fontRef>
-            </p:style>
-          </p:cxnSp>
-          <p:cxnSp>
-            <p:nvCxnSpPr>
-              <p:cNvPr id="17" name="Straight Arrow Connector 16"/>
-              <p:cNvCxnSpPr>
-                <a:stCxn id="10" idx="2"/>
-              </p:cNvCxnSpPr>
-              <p:nvPr/>
-            </p:nvCxnSpPr>
-            <p:spPr>
-              <a:xfrm flipH="1">
-                <a:off x="3268201" y="3706836"/>
-                <a:ext cx="837340" cy="249311"/>
+                <a:off x="5609960" y="3049828"/>
+                <a:ext cx="862112" cy="249311"/>
               </a:xfrm>
               <a:prstGeom prst="straightConnector1">
                 <a:avLst/>
@@ -3517,768 +4004,17 @@
               </a:fontRef>
             </p:style>
           </p:cxnSp>
-          <p:cxnSp>
-            <p:nvCxnSpPr>
-              <p:cNvPr id="21" name="Straight Arrow Connector 20"/>
-              <p:cNvCxnSpPr>
-                <a:stCxn id="10" idx="2"/>
-                <a:endCxn id="12" idx="0"/>
-              </p:cNvCxnSpPr>
-              <p:nvPr/>
-            </p:nvCxnSpPr>
-            <p:spPr>
-              <a:xfrm>
-                <a:off x="4105541" y="3706836"/>
-                <a:ext cx="7696" cy="249311"/>
-              </a:xfrm>
-              <a:prstGeom prst="straightConnector1">
-                <a:avLst/>
-              </a:prstGeom>
-              <a:ln w="38100">
-                <a:solidFill>
-                  <a:schemeClr val="tx1"/>
-                </a:solidFill>
-                <a:prstDash val="solid"/>
-                <a:tailEnd type="triangle"/>
-              </a:ln>
-            </p:spPr>
-            <p:style>
-              <a:lnRef idx="1">
-                <a:schemeClr val="accent1"/>
-              </a:lnRef>
-              <a:fillRef idx="0">
-                <a:schemeClr val="accent1"/>
-              </a:fillRef>
-              <a:effectRef idx="0">
-                <a:schemeClr val="accent1"/>
-              </a:effectRef>
-              <a:fontRef idx="minor">
-                <a:schemeClr val="tx1"/>
-              </a:fontRef>
-            </p:style>
-          </p:cxnSp>
-          <p:sp>
-            <p:nvSpPr>
-              <p:cNvPr id="27" name="TextBox 26"/>
-              <p:cNvSpPr txBox="1"/>
-              <p:nvPr/>
-            </p:nvSpPr>
-            <p:spPr>
-              <a:xfrm>
-                <a:off x="4837824" y="2561517"/>
-                <a:ext cx="2001702" cy="646331"/>
-              </a:xfrm>
-              <a:prstGeom prst="rect">
-                <a:avLst/>
-              </a:prstGeom>
-              <a:noFill/>
-            </p:spPr>
-            <p:txBody>
-              <a:bodyPr wrap="none" rtlCol="0">
-                <a:spAutoFit/>
-              </a:bodyPr>
-              <a:lstStyle/>
-              <a:p>
-                <a:r>
-                  <a:rPr lang="en-US" dirty="0" smtClean="0">
-                    <a:solidFill>
-                      <a:schemeClr val="tx1">
-                        <a:lumMod val="50000"/>
-                        <a:lumOff val="50000"/>
-                      </a:schemeClr>
-                    </a:solidFill>
-                  </a:rPr>
-                  <a:t>BGP Control Graph</a:t>
-                </a:r>
-              </a:p>
-              <a:p>
-                <a:r>
-                  <a:rPr lang="en-US" dirty="0" smtClean="0">
-                    <a:solidFill>
-                      <a:schemeClr val="tx1">
-                        <a:lumMod val="50000"/>
-                        <a:lumOff val="50000"/>
-                      </a:schemeClr>
-                    </a:solidFill>
-                  </a:rPr>
-                  <a:t>Safety Analysis</a:t>
-                </a:r>
-                <a:endParaRPr lang="en-US" dirty="0">
-                  <a:solidFill>
-                    <a:schemeClr val="tx1">
-                      <a:lumMod val="50000"/>
-                      <a:lumOff val="50000"/>
-                    </a:schemeClr>
-                  </a:solidFill>
-                </a:endParaRPr>
-              </a:p>
-            </p:txBody>
-          </p:sp>
-          <p:sp>
-            <p:nvSpPr>
-              <p:cNvPr id="28" name="Rectangle 27"/>
-              <p:cNvSpPr/>
-              <p:nvPr/>
-            </p:nvSpPr>
-            <p:spPr>
-              <a:xfrm>
-                <a:off x="1992537" y="2708707"/>
-                <a:ext cx="1069144" cy="347889"/>
-              </a:xfrm>
-              <a:prstGeom prst="rect">
-                <a:avLst/>
-              </a:prstGeom>
-              <a:solidFill>
-                <a:schemeClr val="bg1"/>
-              </a:solidFill>
-              <a:ln>
-                <a:solidFill>
-                  <a:schemeClr val="tx1"/>
-                </a:solidFill>
-              </a:ln>
-            </p:spPr>
-            <p:style>
-              <a:lnRef idx="2">
-                <a:schemeClr val="accent1">
-                  <a:shade val="50000"/>
-                </a:schemeClr>
-              </a:lnRef>
-              <a:fillRef idx="1">
-                <a:schemeClr val="accent1"/>
-              </a:fillRef>
-              <a:effectRef idx="0">
-                <a:schemeClr val="accent1"/>
-              </a:effectRef>
-              <a:fontRef idx="minor">
-                <a:schemeClr val="lt1"/>
-              </a:fontRef>
-            </p:style>
-            <p:txBody>
-              <a:bodyPr rtlCol="0" anchor="ctr"/>
-              <a:lstStyle/>
-              <a:p>
-                <a:pPr algn="ctr"/>
-                <a:r>
-                  <a:rPr lang="en-US" dirty="0" smtClean="0">
-                    <a:solidFill>
-                      <a:schemeClr val="tx1"/>
-                    </a:solidFill>
-                  </a:rPr>
-                  <a:t>Topology</a:t>
-                </a:r>
-                <a:endParaRPr lang="en-US" dirty="0">
-                  <a:solidFill>
-                    <a:schemeClr val="tx1"/>
-                  </a:solidFill>
-                </a:endParaRPr>
-              </a:p>
-            </p:txBody>
-          </p:sp>
-          <p:cxnSp>
-            <p:nvCxnSpPr>
-              <p:cNvPr id="29" name="Straight Arrow Connector 28"/>
-              <p:cNvCxnSpPr>
-                <a:stCxn id="28" idx="3"/>
-                <a:endCxn id="9" idx="1"/>
-              </p:cNvCxnSpPr>
-              <p:nvPr/>
-            </p:nvCxnSpPr>
-            <p:spPr>
-              <a:xfrm>
-                <a:off x="3061681" y="2882652"/>
-                <a:ext cx="413040" cy="0"/>
-              </a:xfrm>
-              <a:prstGeom prst="straightConnector1">
-                <a:avLst/>
-              </a:prstGeom>
-              <a:ln w="38100">
-                <a:solidFill>
-                  <a:schemeClr val="tx1"/>
-                </a:solidFill>
-                <a:tailEnd type="triangle"/>
-              </a:ln>
-            </p:spPr>
-            <p:style>
-              <a:lnRef idx="1">
-                <a:schemeClr val="accent1"/>
-              </a:lnRef>
-              <a:fillRef idx="0">
-                <a:schemeClr val="accent1"/>
-              </a:fillRef>
-              <a:effectRef idx="0">
-                <a:schemeClr val="accent1"/>
-              </a:effectRef>
-              <a:fontRef idx="minor">
-                <a:schemeClr val="tx1"/>
-              </a:fontRef>
-            </p:style>
-          </p:cxnSp>
-          <p:sp>
-            <p:nvSpPr>
-              <p:cNvPr id="32" name="Rectangle 31"/>
-              <p:cNvSpPr/>
-              <p:nvPr/>
-            </p:nvSpPr>
-            <p:spPr>
-              <a:xfrm>
-                <a:off x="1505481" y="1427871"/>
-                <a:ext cx="1683200" cy="351693"/>
-              </a:xfrm>
-              <a:prstGeom prst="rect">
-                <a:avLst/>
-              </a:prstGeom>
-              <a:solidFill>
-                <a:schemeClr val="bg1"/>
-              </a:solidFill>
-              <a:ln>
-                <a:solidFill>
-                  <a:schemeClr val="tx1"/>
-                </a:solidFill>
-              </a:ln>
-            </p:spPr>
-            <p:style>
-              <a:lnRef idx="2">
-                <a:schemeClr val="accent1">
-                  <a:shade val="50000"/>
-                </a:schemeClr>
-              </a:lnRef>
-              <a:fillRef idx="1">
-                <a:schemeClr val="accent1"/>
-              </a:fillRef>
-              <a:effectRef idx="0">
-                <a:schemeClr val="accent1"/>
-              </a:effectRef>
-              <a:fontRef idx="minor">
-                <a:schemeClr val="lt1"/>
-              </a:fontRef>
-            </p:style>
-            <p:txBody>
-              <a:bodyPr rtlCol="0" anchor="ctr"/>
-              <a:lstStyle/>
-              <a:p>
-                <a:pPr algn="ctr"/>
-                <a:r>
-                  <a:rPr lang="en-US" dirty="0" smtClean="0">
-                    <a:solidFill>
-                      <a:schemeClr val="tx1"/>
-                    </a:solidFill>
-                  </a:rPr>
-                  <a:t>Network Policy</a:t>
-                </a:r>
-                <a:endParaRPr lang="en-US" dirty="0">
-                  <a:solidFill>
-                    <a:schemeClr val="tx1"/>
-                  </a:solidFill>
-                </a:endParaRPr>
-              </a:p>
-            </p:txBody>
-          </p:sp>
-          <p:cxnSp>
-            <p:nvCxnSpPr>
-              <p:cNvPr id="33" name="Straight Arrow Connector 32"/>
-              <p:cNvCxnSpPr>
-                <a:stCxn id="32" idx="3"/>
-                <a:endCxn id="4" idx="1"/>
-              </p:cNvCxnSpPr>
-              <p:nvPr/>
-            </p:nvCxnSpPr>
-            <p:spPr>
-              <a:xfrm>
-                <a:off x="3188681" y="1603718"/>
-                <a:ext cx="286040" cy="4689"/>
-              </a:xfrm>
-              <a:prstGeom prst="straightConnector1">
-                <a:avLst/>
-              </a:prstGeom>
-              <a:ln w="38100">
-                <a:solidFill>
-                  <a:schemeClr val="tx1"/>
-                </a:solidFill>
-                <a:tailEnd type="triangle"/>
-              </a:ln>
-            </p:spPr>
-            <p:style>
-              <a:lnRef idx="1">
-                <a:schemeClr val="accent1"/>
-              </a:lnRef>
-              <a:fillRef idx="0">
-                <a:schemeClr val="accent1"/>
-              </a:fillRef>
-              <a:effectRef idx="0">
-                <a:schemeClr val="accent1"/>
-              </a:effectRef>
-              <a:fontRef idx="minor">
-                <a:schemeClr val="tx1"/>
-              </a:fontRef>
-            </p:style>
-          </p:cxnSp>
-          <p:sp>
-            <p:nvSpPr>
-              <p:cNvPr id="34" name="TextBox 33"/>
-              <p:cNvSpPr txBox="1"/>
-              <p:nvPr/>
-            </p:nvSpPr>
-            <p:spPr>
-              <a:xfrm>
-                <a:off x="4830908" y="3212825"/>
-                <a:ext cx="1944571" cy="646331"/>
-              </a:xfrm>
-              <a:prstGeom prst="rect">
-                <a:avLst/>
-              </a:prstGeom>
-              <a:noFill/>
-            </p:spPr>
-            <p:txBody>
-              <a:bodyPr wrap="none" rtlCol="0">
-                <a:spAutoFit/>
-              </a:bodyPr>
-              <a:lstStyle/>
-              <a:p>
-                <a:r>
-                  <a:rPr lang="en-US" dirty="0" err="1" smtClean="0">
-                    <a:solidFill>
-                      <a:schemeClr val="tx1">
-                        <a:lumMod val="50000"/>
-                        <a:lumOff val="50000"/>
-                      </a:schemeClr>
-                    </a:solidFill>
-                  </a:rPr>
-                  <a:t>Config</a:t>
-                </a:r>
-                <a:r>
-                  <a:rPr lang="en-US" dirty="0" smtClean="0">
-                    <a:solidFill>
-                      <a:schemeClr val="tx1">
-                        <a:lumMod val="50000"/>
-                        <a:lumOff val="50000"/>
-                      </a:schemeClr>
-                    </a:solidFill>
-                  </a:rPr>
-                  <a:t> Generation </a:t>
-                </a:r>
-                <a:br>
-                  <a:rPr lang="en-US" dirty="0" smtClean="0">
-                    <a:solidFill>
-                      <a:schemeClr val="tx1">
-                        <a:lumMod val="50000"/>
-                        <a:lumOff val="50000"/>
-                      </a:schemeClr>
-                    </a:solidFill>
-                  </a:rPr>
-                </a:br>
-                <a:r>
-                  <a:rPr lang="en-US" dirty="0" smtClean="0">
-                    <a:solidFill>
-                      <a:schemeClr val="tx1">
-                        <a:lumMod val="50000"/>
-                        <a:lumOff val="50000"/>
-                      </a:schemeClr>
-                    </a:solidFill>
-                  </a:rPr>
-                  <a:t>+ Minimization</a:t>
-                </a:r>
-                <a:endParaRPr lang="en-US" dirty="0">
-                  <a:solidFill>
-                    <a:schemeClr val="tx1">
-                      <a:lumMod val="50000"/>
-                      <a:lumOff val="50000"/>
-                    </a:schemeClr>
-                  </a:solidFill>
-                </a:endParaRPr>
-              </a:p>
-            </p:txBody>
-          </p:sp>
-          <p:sp>
-            <p:nvSpPr>
-              <p:cNvPr id="61" name="Freeform 60"/>
-              <p:cNvSpPr/>
-              <p:nvPr/>
-            </p:nvSpPr>
-            <p:spPr>
-              <a:xfrm flipH="1">
-                <a:off x="3096845" y="3344881"/>
-                <a:ext cx="405784" cy="343365"/>
-              </a:xfrm>
-              <a:custGeom>
-                <a:avLst/>
-                <a:gdLst>
-                  <a:gd name="connsiteX0" fmla="*/ 0 w 571500"/>
-                  <a:gd name="connsiteY0" fmla="*/ 0 h 647700"/>
-                  <a:gd name="connsiteX1" fmla="*/ 571500 w 571500"/>
-                  <a:gd name="connsiteY1" fmla="*/ 647700 h 647700"/>
-                  <a:gd name="connsiteX0" fmla="*/ 0 w 571500"/>
-                  <a:gd name="connsiteY0" fmla="*/ 0 h 647700"/>
-                  <a:gd name="connsiteX1" fmla="*/ 402981 w 571500"/>
-                  <a:gd name="connsiteY1" fmla="*/ 80596 h 647700"/>
-                  <a:gd name="connsiteX2" fmla="*/ 571500 w 571500"/>
-                  <a:gd name="connsiteY2" fmla="*/ 647700 h 647700"/>
-                  <a:gd name="connsiteX0" fmla="*/ 0 w 642179"/>
-                  <a:gd name="connsiteY0" fmla="*/ 0 h 647700"/>
-                  <a:gd name="connsiteX1" fmla="*/ 402981 w 642179"/>
-                  <a:gd name="connsiteY1" fmla="*/ 80596 h 647700"/>
-                  <a:gd name="connsiteX2" fmla="*/ 637442 w 642179"/>
-                  <a:gd name="connsiteY2" fmla="*/ 361950 h 647700"/>
-                  <a:gd name="connsiteX3" fmla="*/ 571500 w 642179"/>
-                  <a:gd name="connsiteY3" fmla="*/ 647700 h 647700"/>
-                  <a:gd name="connsiteX0" fmla="*/ 0 w 638397"/>
-                  <a:gd name="connsiteY0" fmla="*/ 0 h 594378"/>
-                  <a:gd name="connsiteX1" fmla="*/ 402981 w 638397"/>
-                  <a:gd name="connsiteY1" fmla="*/ 80596 h 594378"/>
-                  <a:gd name="connsiteX2" fmla="*/ 637442 w 638397"/>
-                  <a:gd name="connsiteY2" fmla="*/ 361950 h 594378"/>
-                  <a:gd name="connsiteX3" fmla="*/ 78248 w 638397"/>
-                  <a:gd name="connsiteY3" fmla="*/ 594378 h 594378"/>
-                  <a:gd name="connsiteX0" fmla="*/ 0 w 638344"/>
-                  <a:gd name="connsiteY0" fmla="*/ 0 h 573050"/>
-                  <a:gd name="connsiteX1" fmla="*/ 402981 w 638344"/>
-                  <a:gd name="connsiteY1" fmla="*/ 80596 h 573050"/>
-                  <a:gd name="connsiteX2" fmla="*/ 637442 w 638344"/>
-                  <a:gd name="connsiteY2" fmla="*/ 361950 h 573050"/>
-                  <a:gd name="connsiteX3" fmla="*/ 41255 w 638344"/>
-                  <a:gd name="connsiteY3" fmla="*/ 573050 h 573050"/>
-                  <a:gd name="connsiteX0" fmla="*/ 0 w 613717"/>
-                  <a:gd name="connsiteY0" fmla="*/ 0 h 573050"/>
-                  <a:gd name="connsiteX1" fmla="*/ 402981 w 613717"/>
-                  <a:gd name="connsiteY1" fmla="*/ 80596 h 573050"/>
-                  <a:gd name="connsiteX2" fmla="*/ 612780 w 613717"/>
-                  <a:gd name="connsiteY2" fmla="*/ 351286 h 573050"/>
-                  <a:gd name="connsiteX3" fmla="*/ 41255 w 613717"/>
-                  <a:gd name="connsiteY3" fmla="*/ 573050 h 573050"/>
-                  <a:gd name="connsiteX0" fmla="*/ 0 w 612780"/>
-                  <a:gd name="connsiteY0" fmla="*/ 0 h 573050"/>
-                  <a:gd name="connsiteX1" fmla="*/ 402981 w 612780"/>
-                  <a:gd name="connsiteY1" fmla="*/ 80596 h 573050"/>
-                  <a:gd name="connsiteX2" fmla="*/ 612780 w 612780"/>
-                  <a:gd name="connsiteY2" fmla="*/ 351286 h 573050"/>
-                  <a:gd name="connsiteX3" fmla="*/ 41255 w 612780"/>
-                  <a:gd name="connsiteY3" fmla="*/ 573050 h 573050"/>
-                  <a:gd name="connsiteX0" fmla="*/ 0 w 612780"/>
-                  <a:gd name="connsiteY0" fmla="*/ 0 h 573050"/>
-                  <a:gd name="connsiteX1" fmla="*/ 402981 w 612780"/>
-                  <a:gd name="connsiteY1" fmla="*/ 80596 h 573050"/>
-                  <a:gd name="connsiteX2" fmla="*/ 612780 w 612780"/>
-                  <a:gd name="connsiteY2" fmla="*/ 351286 h 573050"/>
-                  <a:gd name="connsiteX3" fmla="*/ 41255 w 612780"/>
-                  <a:gd name="connsiteY3" fmla="*/ 573050 h 573050"/>
-                  <a:gd name="connsiteX0" fmla="*/ 0 w 600449"/>
-                  <a:gd name="connsiteY0" fmla="*/ 43944 h 499687"/>
-                  <a:gd name="connsiteX1" fmla="*/ 390650 w 600449"/>
-                  <a:gd name="connsiteY1" fmla="*/ 7233 h 499687"/>
-                  <a:gd name="connsiteX2" fmla="*/ 600449 w 600449"/>
-                  <a:gd name="connsiteY2" fmla="*/ 277923 h 499687"/>
-                  <a:gd name="connsiteX3" fmla="*/ 28924 w 600449"/>
-                  <a:gd name="connsiteY3" fmla="*/ 499687 h 499687"/>
-                  <a:gd name="connsiteX0" fmla="*/ 8302 w 608751"/>
-                  <a:gd name="connsiteY0" fmla="*/ 43944 h 401331"/>
-                  <a:gd name="connsiteX1" fmla="*/ 398952 w 608751"/>
-                  <a:gd name="connsiteY1" fmla="*/ 7233 h 401331"/>
-                  <a:gd name="connsiteX2" fmla="*/ 608751 w 608751"/>
-                  <a:gd name="connsiteY2" fmla="*/ 277923 h 401331"/>
-                  <a:gd name="connsiteX3" fmla="*/ 232 w 608751"/>
-                  <a:gd name="connsiteY3" fmla="*/ 382380 h 401331"/>
-                  <a:gd name="connsiteX0" fmla="*/ 8303 w 608752"/>
-                  <a:gd name="connsiteY0" fmla="*/ 43944 h 375699"/>
-                  <a:gd name="connsiteX1" fmla="*/ 398953 w 608752"/>
-                  <a:gd name="connsiteY1" fmla="*/ 7233 h 375699"/>
-                  <a:gd name="connsiteX2" fmla="*/ 608752 w 608752"/>
-                  <a:gd name="connsiteY2" fmla="*/ 277923 h 375699"/>
-                  <a:gd name="connsiteX3" fmla="*/ 233 w 608752"/>
-                  <a:gd name="connsiteY3" fmla="*/ 297065 h 375699"/>
-                  <a:gd name="connsiteX0" fmla="*/ 8380 w 505607"/>
-                  <a:gd name="connsiteY0" fmla="*/ 43944 h 351927"/>
-                  <a:gd name="connsiteX1" fmla="*/ 399030 w 505607"/>
-                  <a:gd name="connsiteY1" fmla="*/ 7233 h 351927"/>
-                  <a:gd name="connsiteX2" fmla="*/ 485517 w 505607"/>
-                  <a:gd name="connsiteY2" fmla="*/ 245929 h 351927"/>
-                  <a:gd name="connsiteX3" fmla="*/ 310 w 505607"/>
-                  <a:gd name="connsiteY3" fmla="*/ 297065 h 351927"/>
-                  <a:gd name="connsiteX0" fmla="*/ 8380 w 485517"/>
-                  <a:gd name="connsiteY0" fmla="*/ 0 h 307983"/>
-                  <a:gd name="connsiteX1" fmla="*/ 349705 w 485517"/>
-                  <a:gd name="connsiteY1" fmla="*/ 16610 h 307983"/>
-                  <a:gd name="connsiteX2" fmla="*/ 485517 w 485517"/>
-                  <a:gd name="connsiteY2" fmla="*/ 201985 h 307983"/>
-                  <a:gd name="connsiteX3" fmla="*/ 310 w 485517"/>
-                  <a:gd name="connsiteY3" fmla="*/ 253121 h 307983"/>
-                  <a:gd name="connsiteX0" fmla="*/ 8380 w 485517"/>
-                  <a:gd name="connsiteY0" fmla="*/ 0 h 307983"/>
-                  <a:gd name="connsiteX1" fmla="*/ 349705 w 485517"/>
-                  <a:gd name="connsiteY1" fmla="*/ 16610 h 307983"/>
-                  <a:gd name="connsiteX2" fmla="*/ 485517 w 485517"/>
-                  <a:gd name="connsiteY2" fmla="*/ 201985 h 307983"/>
-                  <a:gd name="connsiteX3" fmla="*/ 310 w 485517"/>
-                  <a:gd name="connsiteY3" fmla="*/ 253121 h 307983"/>
-                  <a:gd name="connsiteX0" fmla="*/ 8380 w 522529"/>
-                  <a:gd name="connsiteY0" fmla="*/ 0 h 307983"/>
-                  <a:gd name="connsiteX1" fmla="*/ 349705 w 522529"/>
-                  <a:gd name="connsiteY1" fmla="*/ 16610 h 307983"/>
-                  <a:gd name="connsiteX2" fmla="*/ 485517 w 522529"/>
-                  <a:gd name="connsiteY2" fmla="*/ 201985 h 307983"/>
-                  <a:gd name="connsiteX3" fmla="*/ 310 w 522529"/>
-                  <a:gd name="connsiteY3" fmla="*/ 253121 h 307983"/>
-                  <a:gd name="connsiteX0" fmla="*/ 8380 w 537806"/>
-                  <a:gd name="connsiteY0" fmla="*/ 0 h 307983"/>
-                  <a:gd name="connsiteX1" fmla="*/ 349705 w 537806"/>
-                  <a:gd name="connsiteY1" fmla="*/ 16610 h 307983"/>
-                  <a:gd name="connsiteX2" fmla="*/ 485517 w 537806"/>
-                  <a:gd name="connsiteY2" fmla="*/ 201985 h 307983"/>
-                  <a:gd name="connsiteX3" fmla="*/ 310 w 537806"/>
-                  <a:gd name="connsiteY3" fmla="*/ 253121 h 307983"/>
-                  <a:gd name="connsiteX0" fmla="*/ 8380 w 485517"/>
-                  <a:gd name="connsiteY0" fmla="*/ 0 h 307983"/>
-                  <a:gd name="connsiteX1" fmla="*/ 349705 w 485517"/>
-                  <a:gd name="connsiteY1" fmla="*/ 16610 h 307983"/>
-                  <a:gd name="connsiteX2" fmla="*/ 485517 w 485517"/>
-                  <a:gd name="connsiteY2" fmla="*/ 201985 h 307983"/>
-                  <a:gd name="connsiteX3" fmla="*/ 310 w 485517"/>
-                  <a:gd name="connsiteY3" fmla="*/ 253121 h 307983"/>
-                  <a:gd name="connsiteX0" fmla="*/ 8380 w 485517"/>
-                  <a:gd name="connsiteY0" fmla="*/ 10985 h 318968"/>
-                  <a:gd name="connsiteX1" fmla="*/ 349705 w 485517"/>
-                  <a:gd name="connsiteY1" fmla="*/ 27595 h 318968"/>
-                  <a:gd name="connsiteX2" fmla="*/ 485517 w 485517"/>
-                  <a:gd name="connsiteY2" fmla="*/ 212970 h 318968"/>
-                  <a:gd name="connsiteX3" fmla="*/ 310 w 485517"/>
-                  <a:gd name="connsiteY3" fmla="*/ 264106 h 318968"/>
-                  <a:gd name="connsiteX0" fmla="*/ 8380 w 485517"/>
-                  <a:gd name="connsiteY0" fmla="*/ 94491 h 306495"/>
-                  <a:gd name="connsiteX1" fmla="*/ 349705 w 485517"/>
-                  <a:gd name="connsiteY1" fmla="*/ 15122 h 306495"/>
-                  <a:gd name="connsiteX2" fmla="*/ 485517 w 485517"/>
-                  <a:gd name="connsiteY2" fmla="*/ 200497 h 306495"/>
-                  <a:gd name="connsiteX3" fmla="*/ 310 w 485517"/>
-                  <a:gd name="connsiteY3" fmla="*/ 251633 h 306495"/>
-                  <a:gd name="connsiteX0" fmla="*/ 8380 w 485517"/>
-                  <a:gd name="connsiteY0" fmla="*/ 84621 h 296625"/>
-                  <a:gd name="connsiteX1" fmla="*/ 263386 w 485517"/>
-                  <a:gd name="connsiteY1" fmla="*/ 15916 h 296625"/>
-                  <a:gd name="connsiteX2" fmla="*/ 485517 w 485517"/>
-                  <a:gd name="connsiteY2" fmla="*/ 190627 h 296625"/>
-                  <a:gd name="connsiteX3" fmla="*/ 310 w 485517"/>
-                  <a:gd name="connsiteY3" fmla="*/ 241763 h 296625"/>
-                  <a:gd name="connsiteX0" fmla="*/ 8380 w 485517"/>
-                  <a:gd name="connsiteY0" fmla="*/ 104438 h 316442"/>
-                  <a:gd name="connsiteX1" fmla="*/ 349705 w 485517"/>
-                  <a:gd name="connsiteY1" fmla="*/ 14404 h 316442"/>
-                  <a:gd name="connsiteX2" fmla="*/ 485517 w 485517"/>
-                  <a:gd name="connsiteY2" fmla="*/ 210444 h 316442"/>
-                  <a:gd name="connsiteX3" fmla="*/ 310 w 485517"/>
-                  <a:gd name="connsiteY3" fmla="*/ 261580 h 316442"/>
-                  <a:gd name="connsiteX0" fmla="*/ 8380 w 485517"/>
-                  <a:gd name="connsiteY0" fmla="*/ 104438 h 316442"/>
-                  <a:gd name="connsiteX1" fmla="*/ 275718 w 485517"/>
-                  <a:gd name="connsiteY1" fmla="*/ 14404 h 316442"/>
-                  <a:gd name="connsiteX2" fmla="*/ 485517 w 485517"/>
-                  <a:gd name="connsiteY2" fmla="*/ 210444 h 316442"/>
-                  <a:gd name="connsiteX3" fmla="*/ 310 w 485517"/>
-                  <a:gd name="connsiteY3" fmla="*/ 261580 h 316442"/>
-                  <a:gd name="connsiteX0" fmla="*/ 8380 w 485517"/>
-                  <a:gd name="connsiteY0" fmla="*/ 104438 h 316442"/>
-                  <a:gd name="connsiteX1" fmla="*/ 275718 w 485517"/>
-                  <a:gd name="connsiteY1" fmla="*/ 14404 h 316442"/>
-                  <a:gd name="connsiteX2" fmla="*/ 485517 w 485517"/>
-                  <a:gd name="connsiteY2" fmla="*/ 210444 h 316442"/>
-                  <a:gd name="connsiteX3" fmla="*/ 310 w 485517"/>
-                  <a:gd name="connsiteY3" fmla="*/ 261580 h 316442"/>
-                  <a:gd name="connsiteX0" fmla="*/ 8380 w 485517"/>
-                  <a:gd name="connsiteY0" fmla="*/ 36988 h 323642"/>
-                  <a:gd name="connsiteX1" fmla="*/ 275718 w 485517"/>
-                  <a:gd name="connsiteY1" fmla="*/ 21604 h 323642"/>
-                  <a:gd name="connsiteX2" fmla="*/ 485517 w 485517"/>
-                  <a:gd name="connsiteY2" fmla="*/ 217644 h 323642"/>
-                  <a:gd name="connsiteX3" fmla="*/ 310 w 485517"/>
-                  <a:gd name="connsiteY3" fmla="*/ 268780 h 323642"/>
-                  <a:gd name="connsiteX0" fmla="*/ 8380 w 485517"/>
-                  <a:gd name="connsiteY0" fmla="*/ 36988 h 345281"/>
-                  <a:gd name="connsiteX1" fmla="*/ 275718 w 485517"/>
-                  <a:gd name="connsiteY1" fmla="*/ 21604 h 345281"/>
-                  <a:gd name="connsiteX2" fmla="*/ 485517 w 485517"/>
-                  <a:gd name="connsiteY2" fmla="*/ 217644 h 345281"/>
-                  <a:gd name="connsiteX3" fmla="*/ 310 w 485517"/>
-                  <a:gd name="connsiteY3" fmla="*/ 332765 h 345281"/>
-                  <a:gd name="connsiteX0" fmla="*/ 8380 w 485517"/>
-                  <a:gd name="connsiteY0" fmla="*/ 15444 h 323737"/>
-                  <a:gd name="connsiteX1" fmla="*/ 275718 w 485517"/>
-                  <a:gd name="connsiteY1" fmla="*/ 60 h 323737"/>
-                  <a:gd name="connsiteX2" fmla="*/ 485517 w 485517"/>
-                  <a:gd name="connsiteY2" fmla="*/ 196100 h 323737"/>
-                  <a:gd name="connsiteX3" fmla="*/ 310 w 485517"/>
-                  <a:gd name="connsiteY3" fmla="*/ 311221 h 323737"/>
-                  <a:gd name="connsiteX0" fmla="*/ 8353 w 485490"/>
-                  <a:gd name="connsiteY0" fmla="*/ 15444 h 319348"/>
-                  <a:gd name="connsiteX1" fmla="*/ 275691 w 485490"/>
-                  <a:gd name="connsiteY1" fmla="*/ 60 h 319348"/>
-                  <a:gd name="connsiteX2" fmla="*/ 485490 w 485490"/>
-                  <a:gd name="connsiteY2" fmla="*/ 196100 h 319348"/>
-                  <a:gd name="connsiteX3" fmla="*/ 283 w 485490"/>
-                  <a:gd name="connsiteY3" fmla="*/ 311221 h 319348"/>
-                  <a:gd name="connsiteX0" fmla="*/ 8353 w 498732"/>
-                  <a:gd name="connsiteY0" fmla="*/ 15444 h 319348"/>
-                  <a:gd name="connsiteX1" fmla="*/ 275691 w 498732"/>
-                  <a:gd name="connsiteY1" fmla="*/ 60 h 319348"/>
-                  <a:gd name="connsiteX2" fmla="*/ 485490 w 498732"/>
-                  <a:gd name="connsiteY2" fmla="*/ 196100 h 319348"/>
-                  <a:gd name="connsiteX3" fmla="*/ 283 w 498732"/>
-                  <a:gd name="connsiteY3" fmla="*/ 311221 h 319348"/>
-                </a:gdLst>
-                <a:ahLst/>
-                <a:cxnLst>
-                  <a:cxn ang="0">
-                    <a:pos x="connsiteX0" y="connsiteY0"/>
-                  </a:cxn>
-                  <a:cxn ang="0">
-                    <a:pos x="connsiteX1" y="connsiteY1"/>
-                  </a:cxn>
-                  <a:cxn ang="0">
-                    <a:pos x="connsiteX2" y="connsiteY2"/>
-                  </a:cxn>
-                  <a:cxn ang="0">
-                    <a:pos x="connsiteX3" y="connsiteY3"/>
-                  </a:cxn>
-                </a:cxnLst>
-                <a:rect l="l" t="t" r="r" b="b"/>
-                <a:pathLst>
-                  <a:path w="498732" h="319348">
-                    <a:moveTo>
-                      <a:pt x="8353" y="15444"/>
-                    </a:moveTo>
-                    <a:cubicBezTo>
-                      <a:pt x="36440" y="42554"/>
-                      <a:pt x="18622" y="-1834"/>
-                      <a:pt x="275691" y="60"/>
-                    </a:cubicBezTo>
-                    <a:cubicBezTo>
-                      <a:pt x="457136" y="15775"/>
-                      <a:pt x="531391" y="101583"/>
-                      <a:pt x="485490" y="196100"/>
-                    </a:cubicBezTo>
-                    <a:cubicBezTo>
-                      <a:pt x="390264" y="418588"/>
-                      <a:pt x="-12173" y="261642"/>
-                      <a:pt x="283" y="311221"/>
-                    </a:cubicBezTo>
-                  </a:path>
-                </a:pathLst>
-              </a:custGeom>
-              <a:noFill/>
-              <a:ln w="38100">
-                <a:solidFill>
-                  <a:schemeClr val="tx1"/>
-                </a:solidFill>
-                <a:headEnd type="none"/>
-                <a:tailEnd type="triangle"/>
-              </a:ln>
-              <a:scene3d>
-                <a:camera prst="orthographicFront">
-                  <a:rot lat="0" lon="19499988" rev="0"/>
-                </a:camera>
-                <a:lightRig rig="threePt" dir="t"/>
-              </a:scene3d>
-            </p:spPr>
-            <p:style>
-              <a:lnRef idx="2">
-                <a:schemeClr val="accent1">
-                  <a:shade val="50000"/>
-                </a:schemeClr>
-              </a:lnRef>
-              <a:fillRef idx="1">
-                <a:schemeClr val="accent1"/>
-              </a:fillRef>
-              <a:effectRef idx="0">
-                <a:schemeClr val="accent1"/>
-              </a:effectRef>
-              <a:fontRef idx="minor">
-                <a:schemeClr val="lt1"/>
-              </a:fontRef>
-            </p:style>
-            <p:txBody>
-              <a:bodyPr rtlCol="0" anchor="ctr"/>
-              <a:lstStyle/>
-              <a:p>
-                <a:pPr algn="ctr"/>
-                <a:endParaRPr lang="en-US"/>
-              </a:p>
-            </p:txBody>
-          </p:sp>
-          <p:sp>
-            <p:nvSpPr>
-              <p:cNvPr id="62" name="TextBox 61"/>
-              <p:cNvSpPr txBox="1"/>
-              <p:nvPr/>
-            </p:nvSpPr>
-            <p:spPr>
-              <a:xfrm>
-                <a:off x="4837824" y="1925268"/>
-                <a:ext cx="1899879" cy="646331"/>
-              </a:xfrm>
-              <a:prstGeom prst="rect">
-                <a:avLst/>
-              </a:prstGeom>
-              <a:noFill/>
-            </p:spPr>
-            <p:txBody>
-              <a:bodyPr wrap="none" rtlCol="0">
-                <a:spAutoFit/>
-              </a:bodyPr>
-              <a:lstStyle/>
-              <a:p>
-                <a:r>
-                  <a:rPr lang="en-US" dirty="0" smtClean="0">
-                    <a:solidFill>
-                      <a:schemeClr val="tx1">
-                        <a:lumMod val="50000"/>
-                        <a:lumOff val="50000"/>
-                      </a:schemeClr>
-                    </a:solidFill>
-                  </a:rPr>
-                  <a:t>Rewriting Rules + </a:t>
-                </a:r>
-              </a:p>
-              <a:p>
-                <a:r>
-                  <a:rPr lang="en-US" dirty="0" smtClean="0">
-                    <a:solidFill>
-                      <a:schemeClr val="tx1">
-                        <a:lumMod val="50000"/>
-                        <a:lumOff val="50000"/>
-                      </a:schemeClr>
-                    </a:solidFill>
-                  </a:rPr>
-                  <a:t>Well-</a:t>
-                </a:r>
-                <a:r>
-                  <a:rPr lang="en-US" dirty="0" err="1" smtClean="0">
-                    <a:solidFill>
-                      <a:schemeClr val="tx1">
-                        <a:lumMod val="50000"/>
-                        <a:lumOff val="50000"/>
-                      </a:schemeClr>
-                    </a:solidFill>
-                  </a:rPr>
-                  <a:t>Formedness</a:t>
-                </a:r>
-                <a:endParaRPr lang="en-US" dirty="0">
-                  <a:solidFill>
-                    <a:schemeClr val="tx1">
-                      <a:lumMod val="50000"/>
-                      <a:lumOff val="50000"/>
-                    </a:schemeClr>
-                  </a:solidFill>
-                </a:endParaRPr>
-              </a:p>
-            </p:txBody>
-          </p:sp>
         </p:grpSp>
         <p:sp>
           <p:nvSpPr>
-            <p:cNvPr id="22" name="Rectangle 21"/>
+            <p:cNvPr id="30" name="Rectangle 29"/>
             <p:cNvSpPr/>
             <p:nvPr/>
           </p:nvSpPr>
           <p:spPr>
             <a:xfrm>
-              <a:off x="6466462" y="3299139"/>
-              <a:ext cx="1069144" cy="374694"/>
+              <a:off x="3809558" y="2521185"/>
+              <a:ext cx="1261640" cy="347889"/>
             </a:xfrm>
             <a:prstGeom prst="rect">
               <a:avLst/>
@@ -4314,12 +4050,12 @@
             <a:p>
               <a:pPr algn="ctr"/>
               <a:r>
-                <a:rPr lang="is-IS" dirty="0" smtClean="0">
+                <a:rPr lang="en-US" dirty="0" smtClean="0">
                   <a:solidFill>
                     <a:schemeClr val="tx1"/>
                   </a:solidFill>
                 </a:rPr>
-                <a:t>…</a:t>
+                <a:t>ABGP</a:t>
               </a:r>
               <a:endParaRPr lang="en-US" dirty="0">
                 <a:solidFill>
@@ -4329,45 +4065,6 @@
             </a:p>
           </p:txBody>
         </p:sp>
-        <p:cxnSp>
-          <p:nvCxnSpPr>
-            <p:cNvPr id="26" name="Straight Arrow Connector 25"/>
-            <p:cNvCxnSpPr>
-              <a:stCxn id="10" idx="2"/>
-            </p:cNvCxnSpPr>
-            <p:nvPr/>
-          </p:nvCxnSpPr>
-          <p:spPr>
-            <a:xfrm>
-              <a:off x="5609960" y="3049828"/>
-              <a:ext cx="862112" cy="249311"/>
-            </a:xfrm>
-            <a:prstGeom prst="straightConnector1">
-              <a:avLst/>
-            </a:prstGeom>
-            <a:ln w="38100">
-              <a:solidFill>
-                <a:schemeClr val="tx1"/>
-              </a:solidFill>
-              <a:prstDash val="solid"/>
-              <a:tailEnd type="triangle"/>
-            </a:ln>
-          </p:spPr>
-          <p:style>
-            <a:lnRef idx="1">
-              <a:schemeClr val="accent1"/>
-            </a:lnRef>
-            <a:fillRef idx="0">
-              <a:schemeClr val="accent1"/>
-            </a:fillRef>
-            <a:effectRef idx="0">
-              <a:schemeClr val="accent1"/>
-            </a:effectRef>
-            <a:fontRef idx="minor">
-              <a:schemeClr val="tx1"/>
-            </a:fontRef>
-          </p:style>
-        </p:cxnSp>
       </p:grpSp>
     </p:spTree>
     <p:extLst>

</xml_diff>